<commit_message>
Added PDF of slideshow. Added resources mentioned in the workshop chat.
</commit_message>
<xml_diff>
--- a/presentation scripts/ShinyConf Presentation 2025.pptx
+++ b/presentation scripts/ShinyConf Presentation 2025.pptx
@@ -276,7 +276,7 @@
               <a:rPr lang="en-US" smtClean="0">
                 <a:latin typeface="Calibri" panose="020F0502020204030204" pitchFamily="34" charset="0"/>
               </a:rPr>
-              <a:t>3/27/2025</a:t>
+              <a:t>4/9/2025</a:t>
             </a:fld>
             <a:endParaRPr lang="en-US">
               <a:latin typeface="Calibri" panose="020F0502020204030204" pitchFamily="34" charset="0"/>
@@ -454,7 +454,7 @@
             <a:fld id="{A50CD39D-89B0-4C68-805A-35C75A7C20C8}" type="datetimeFigureOut">
               <a:rPr lang="en-US" smtClean="0"/>
               <a:pPr/>
-              <a:t>3/27/2025</a:t>
+              <a:t>4/9/2025</a:t>
             </a:fld>
             <a:endParaRPr lang="en-US"/>
           </a:p>
@@ -3455,7 +3455,7 @@
           <a:p>
             <a:fld id="{D7ED242C-24FB-43A0-BCB6-43756FC812F6}" type="datetime1">
               <a:rPr lang="en-US" smtClean="0"/>
-              <a:t>3/27/2025</a:t>
+              <a:t>4/9/2025</a:t>
             </a:fld>
             <a:endParaRPr lang="en-US"/>
           </a:p>
@@ -3793,7 +3793,7 @@
           <a:p>
             <a:fld id="{F4B91AA0-3BA7-4036-A3DA-317C6C4FFA29}" type="datetime1">
               <a:rPr lang="en-US" smtClean="0"/>
-              <a:t>3/27/2025</a:t>
+              <a:t>4/9/2025</a:t>
             </a:fld>
             <a:endParaRPr lang="en-US"/>
           </a:p>
@@ -4104,7 +4104,7 @@
           <a:p>
             <a:fld id="{F4B91AA0-3BA7-4036-A3DA-317C6C4FFA29}" type="datetime1">
               <a:rPr lang="en-US" smtClean="0"/>
-              <a:t>3/27/2025</a:t>
+              <a:t>4/9/2025</a:t>
             </a:fld>
             <a:endParaRPr lang="en-US"/>
           </a:p>
@@ -4399,7 +4399,7 @@
           <a:p>
             <a:fld id="{4868D85E-9AAE-43DE-B77A-6CCC9C16CBEC}" type="datetime1">
               <a:rPr lang="en-US" smtClean="0"/>
-              <a:t>3/27/2025</a:t>
+              <a:t>4/9/2025</a:t>
             </a:fld>
             <a:endParaRPr lang="en-US"/>
           </a:p>
@@ -4735,7 +4735,7 @@
             <a:fld id="{F4B91AA0-3BA7-4036-A3DA-317C6C4FFA29}" type="datetime1">
               <a:rPr lang="en-US" smtClean="0"/>
               <a:pPr/>
-              <a:t>3/27/2025</a:t>
+              <a:t>4/9/2025</a:t>
             </a:fld>
             <a:endParaRPr lang="en-US"/>
           </a:p>
@@ -5089,7 +5089,7 @@
           <a:p>
             <a:fld id="{F4B91AA0-3BA7-4036-A3DA-317C6C4FFA29}" type="datetime1">
               <a:rPr lang="en-US" smtClean="0"/>
-              <a:t>3/27/2025</a:t>
+              <a:t>4/9/2025</a:t>
             </a:fld>
             <a:endParaRPr lang="en-US"/>
           </a:p>
@@ -5438,7 +5438,7 @@
           <a:p>
             <a:fld id="{F4B91AA0-3BA7-4036-A3DA-317C6C4FFA29}" type="datetime1">
               <a:rPr lang="en-US" smtClean="0"/>
-              <a:t>3/27/2025</a:t>
+              <a:t>4/9/2025</a:t>
             </a:fld>
             <a:endParaRPr lang="en-US"/>
           </a:p>
@@ -5786,7 +5786,7 @@
           <a:p>
             <a:fld id="{4868D85E-9AAE-43DE-B77A-6CCC9C16CBEC}" type="datetime1">
               <a:rPr lang="en-US" smtClean="0"/>
-              <a:t>3/27/2025</a:t>
+              <a:t>4/9/2025</a:t>
             </a:fld>
             <a:endParaRPr lang="en-US"/>
           </a:p>
@@ -6448,7 +6448,7 @@
           <a:p>
             <a:fld id="{936DB2D6-5DF4-4264-A4A1-7D3EAF38D255}" type="datetime1">
               <a:rPr lang="en-US" smtClean="0"/>
-              <a:t>3/27/2025</a:t>
+              <a:t>4/9/2025</a:t>
             </a:fld>
             <a:endParaRPr lang="en-US"/>
           </a:p>
@@ -7033,7 +7033,7 @@
           <a:p>
             <a:fld id="{936DB2D6-5DF4-4264-A4A1-7D3EAF38D255}" type="datetime1">
               <a:rPr lang="en-US" smtClean="0"/>
-              <a:t>3/27/2025</a:t>
+              <a:t>4/9/2025</a:t>
             </a:fld>
             <a:endParaRPr lang="en-US"/>
           </a:p>
@@ -7686,7 +7686,7 @@
           <a:p>
             <a:fld id="{8DC79626-CE5A-4834-975C-E7305BA2E281}" type="datetime1">
               <a:rPr lang="en-US" smtClean="0"/>
-              <a:t>3/27/2025</a:t>
+              <a:t>4/9/2025</a:t>
             </a:fld>
             <a:endParaRPr lang="en-US"/>
           </a:p>
@@ -8039,7 +8039,7 @@
           <a:p>
             <a:fld id="{D7ED242C-24FB-43A0-BCB6-43756FC812F6}" type="datetime1">
               <a:rPr lang="en-US" smtClean="0"/>
-              <a:t>3/27/2025</a:t>
+              <a:t>4/9/2025</a:t>
             </a:fld>
             <a:endParaRPr lang="en-US"/>
           </a:p>
@@ -8486,7 +8486,7 @@
           <a:p>
             <a:fld id="{7F519661-29C3-4FE0-9FC3-375A85A42C46}" type="datetime1">
               <a:rPr lang="en-US" smtClean="0"/>
-              <a:t>3/27/2025</a:t>
+              <a:t>4/9/2025</a:t>
             </a:fld>
             <a:endParaRPr lang="en-US"/>
           </a:p>
@@ -9084,7 +9084,7 @@
           <a:p>
             <a:fld id="{4B4EEDC6-36CA-4209-B482-2ED76AA0BF08}" type="datetime1">
               <a:rPr lang="en-US" smtClean="0"/>
-              <a:t>3/27/2025</a:t>
+              <a:t>4/9/2025</a:t>
             </a:fld>
             <a:endParaRPr lang="en-US"/>
           </a:p>
@@ -9594,7 +9594,7 @@
           <a:p>
             <a:fld id="{4B4EEDC6-36CA-4209-B482-2ED76AA0BF08}" type="datetime1">
               <a:rPr lang="en-US" smtClean="0"/>
-              <a:t>3/27/2025</a:t>
+              <a:t>4/9/2025</a:t>
             </a:fld>
             <a:endParaRPr lang="en-US"/>
           </a:p>
@@ -10248,7 +10248,7 @@
           <a:p>
             <a:fld id="{1815FB38-58F3-410A-8DA4-4B706967601F}" type="datetime1">
               <a:rPr lang="en-US" smtClean="0"/>
-              <a:t>3/27/2025</a:t>
+              <a:t>4/9/2025</a:t>
             </a:fld>
             <a:endParaRPr lang="en-US"/>
           </a:p>
@@ -10696,7 +10696,7 @@
           <a:p>
             <a:fld id="{0366E0EA-2D80-452F-9963-33FA7A36BC09}" type="datetime1">
               <a:rPr lang="en-US" smtClean="0"/>
-              <a:t>3/27/2025</a:t>
+              <a:t>4/9/2025</a:t>
             </a:fld>
             <a:endParaRPr lang="en-US"/>
           </a:p>
@@ -11482,7 +11482,7 @@
           <a:p>
             <a:fld id="{1815FB38-58F3-410A-8DA4-4B706967601F}" type="datetime1">
               <a:rPr lang="en-US" smtClean="0"/>
-              <a:t>3/27/2025</a:t>
+              <a:t>4/9/2025</a:t>
             </a:fld>
             <a:endParaRPr lang="en-US"/>
           </a:p>
@@ -12841,7 +12841,7 @@
           <a:p>
             <a:fld id="{F4B91AA0-3BA7-4036-A3DA-317C6C4FFA29}" type="datetime1">
               <a:rPr lang="en-US" smtClean="0"/>
-              <a:t>3/27/2025</a:t>
+              <a:t>4/9/2025</a:t>
             </a:fld>
             <a:endParaRPr lang="en-US"/>
           </a:p>
@@ -13618,7 +13618,7 @@
           <a:p>
             <a:fld id="{5D76A200-3168-4D33-A718-3974884CE863}" type="datetime1">
               <a:rPr lang="en-US" smtClean="0"/>
-              <a:t>3/27/2025</a:t>
+              <a:t>4/9/2025</a:t>
             </a:fld>
             <a:endParaRPr lang="en-US"/>
           </a:p>
@@ -14383,7 +14383,7 @@
           <a:p>
             <a:fld id="{276FB33B-BCEE-4E25-B97B-A564B0E1024B}" type="datetime1">
               <a:rPr lang="en-US" smtClean="0"/>
-              <a:t>3/27/2025</a:t>
+              <a:t>4/9/2025</a:t>
             </a:fld>
             <a:endParaRPr lang="en-US"/>
           </a:p>
@@ -15159,7 +15159,7 @@
           <a:p>
             <a:fld id="{276FB33B-BCEE-4E25-B97B-A564B0E1024B}" type="datetime1">
               <a:rPr lang="en-US" smtClean="0"/>
-              <a:t>3/27/2025</a:t>
+              <a:t>4/9/2025</a:t>
             </a:fld>
             <a:endParaRPr lang="en-US"/>
           </a:p>
@@ -15478,7 +15478,7 @@
           <a:p>
             <a:fld id="{A8CA1A9B-139F-4606-AD0A-F3253110DAE5}" type="datetime1">
               <a:rPr lang="en-US" smtClean="0"/>
-              <a:t>3/27/2025</a:t>
+              <a:t>4/9/2025</a:t>
             </a:fld>
             <a:endParaRPr lang="en-US"/>
           </a:p>
@@ -15841,7 +15841,7 @@
             <a:fld id="{276FB33B-BCEE-4E25-B97B-A564B0E1024B}" type="datetime1">
               <a:rPr lang="en-US" smtClean="0"/>
               <a:pPr/>
-              <a:t>3/27/2025</a:t>
+              <a:t>4/9/2025</a:t>
             </a:fld>
             <a:endParaRPr lang="en-US"/>
           </a:p>
@@ -19886,7 +19886,7 @@
           <a:p>
             <a:fld id="{16D5E9BE-CAA2-49B9-B3D1-E3587DB5B59A}" type="datetime1">
               <a:rPr lang="en-US" smtClean="0"/>
-              <a:t>3/27/2025</a:t>
+              <a:t>4/9/2025</a:t>
             </a:fld>
             <a:endParaRPr lang="en-US"/>
           </a:p>
@@ -20318,7 +20318,7 @@
           <a:p>
             <a:fld id="{16D5E9BE-CAA2-49B9-B3D1-E3587DB5B59A}" type="datetime1">
               <a:rPr lang="en-US" smtClean="0"/>
-              <a:t>3/27/2025</a:t>
+              <a:t>4/9/2025</a:t>
             </a:fld>
             <a:endParaRPr lang="en-US"/>
           </a:p>
@@ -20603,7 +20603,7 @@
           <a:p>
             <a:fld id="{824D5D47-1752-4D84-8BFB-C2F71A34C932}" type="datetime1">
               <a:rPr lang="en-US" smtClean="0"/>
-              <a:t>3/27/2025</a:t>
+              <a:t>4/9/2025</a:t>
             </a:fld>
             <a:endParaRPr lang="en-US"/>
           </a:p>
@@ -23030,7 +23030,7 @@
           <a:p>
             <a:fld id="{D094F804-653A-41F1-A565-1098D9DEB37A}" type="datetime1">
               <a:rPr lang="en-US" smtClean="0"/>
-              <a:t>3/27/2025</a:t>
+              <a:t>4/9/2025</a:t>
             </a:fld>
             <a:endParaRPr lang="en-US"/>
           </a:p>
@@ -23302,7 +23302,7 @@
           <a:p>
             <a:fld id="{466A75E6-E45B-4C5D-981E-7C8ED0C72F5D}" type="datetime1">
               <a:rPr lang="en-US" smtClean="0"/>
-              <a:t>3/27/2025</a:t>
+              <a:t>4/9/2025</a:t>
             </a:fld>
             <a:endParaRPr lang="en-US"/>
           </a:p>
@@ -23549,7 +23549,7 @@
           <a:p>
             <a:fld id="{F8B25D9D-5365-41CD-BF43-4FFFCBF4BBDA}" type="datetime1">
               <a:rPr lang="en-US" smtClean="0"/>
-              <a:t>3/27/2025</a:t>
+              <a:t>4/9/2025</a:t>
             </a:fld>
             <a:endParaRPr lang="en-US"/>
           </a:p>
@@ -23840,7 +23840,7 @@
             <a:fld id="{466A75E6-E45B-4C5D-981E-7C8ED0C72F5D}" type="datetime1">
               <a:rPr lang="en-US" smtClean="0"/>
               <a:pPr/>
-              <a:t>3/27/2025</a:t>
+              <a:t>4/9/2025</a:t>
             </a:fld>
             <a:endParaRPr lang="en-US"/>
           </a:p>
@@ -24239,7 +24239,7 @@
           <a:p>
             <a:fld id="{7C198DD1-C477-482D-A126-3FBDD1778E48}" type="datetime1">
               <a:rPr lang="en-US" smtClean="0"/>
-              <a:t>3/27/2025</a:t>
+              <a:t>4/9/2025</a:t>
             </a:fld>
             <a:endParaRPr lang="en-US"/>
           </a:p>
@@ -24537,7 +24537,7 @@
           <a:p>
             <a:fld id="{D094F804-653A-41F1-A565-1098D9DEB37A}" type="datetime1">
               <a:rPr lang="en-US" smtClean="0"/>
-              <a:t>3/27/2025</a:t>
+              <a:t>4/9/2025</a:t>
             </a:fld>
             <a:endParaRPr lang="en-US"/>
           </a:p>
@@ -25002,7 +25002,7 @@
           <a:p>
             <a:fld id="{9A198C9B-0587-4A1E-9E03-E4C9FE222F08}" type="datetime1">
               <a:rPr lang="en-US" smtClean="0"/>
-              <a:t>3/27/2025</a:t>
+              <a:t>4/9/2025</a:t>
             </a:fld>
             <a:endParaRPr lang="en-US"/>
           </a:p>
@@ -25411,7 +25411,7 @@
           <a:p>
             <a:fld id="{5485A5BA-A5F9-4138-9E4B-FFD626F6437A}" type="datetime1">
               <a:rPr lang="en-US" smtClean="0"/>
-              <a:t>3/27/2025</a:t>
+              <a:t>4/9/2025</a:t>
             </a:fld>
             <a:endParaRPr lang="en-US"/>
           </a:p>
@@ -25715,7 +25715,7 @@
           <a:p>
             <a:fld id="{66C283A4-7960-4BFD-B3A5-A2CC5BB2A473}" type="datetime1">
               <a:rPr lang="en-US" smtClean="0"/>
-              <a:t>3/27/2025</a:t>
+              <a:t>4/9/2025</a:t>
             </a:fld>
             <a:endParaRPr lang="en-US"/>
           </a:p>
@@ -25948,7 +25948,7 @@
           <a:p>
             <a:fld id="{068C556E-7101-4471-A958-3911E20944AB}" type="datetime1">
               <a:rPr lang="en-US" smtClean="0"/>
-              <a:t>3/27/2025</a:t>
+              <a:t>4/9/2025</a:t>
             </a:fld>
             <a:endParaRPr lang="en-US"/>
           </a:p>
@@ -26455,7 +26455,7 @@
           <a:lstStyle/>
           <a:p>
             <a:r>
-              <a:rPr lang="en-US">
+              <a:rPr lang="en-US" dirty="0">
                 <a:cs typeface="Calibri"/>
               </a:rPr>
               <a:t>Web Accessibility in Online Dashboard Design</a:t>
@@ -26858,7 +26858,7 @@
           <a:p>
             <a:fld id="{824D5D47-1752-4D84-8BFB-C2F71A34C932}" type="datetime1">
               <a:rPr lang="en-US" smtClean="0"/>
-              <a:t>3/27/2025</a:t>
+              <a:t>4/9/2025</a:t>
             </a:fld>
             <a:endParaRPr lang="en-US"/>
           </a:p>
@@ -27215,7 +27215,7 @@
           <a:p>
             <a:fld id="{824D5D47-1752-4D84-8BFB-C2F71A34C932}" type="datetime1">
               <a:rPr lang="en-US" smtClean="0"/>
-              <a:t>3/27/2025</a:t>
+              <a:t>4/9/2025</a:t>
             </a:fld>
             <a:endParaRPr lang="en-US"/>
           </a:p>
@@ -27490,7 +27490,7 @@
           <a:p>
             <a:fld id="{824D5D47-1752-4D84-8BFB-C2F71A34C932}" type="datetime1">
               <a:rPr lang="en-US" smtClean="0"/>
-              <a:t>3/27/2025</a:t>
+              <a:t>4/9/2025</a:t>
             </a:fld>
             <a:endParaRPr lang="en-US"/>
           </a:p>
@@ -27826,7 +27826,7 @@
           <a:p>
             <a:fld id="{9A198C9B-0587-4A1E-9E03-E4C9FE222F08}" type="datetime1">
               <a:rPr lang="en-US" smtClean="0"/>
-              <a:t>3/27/2025</a:t>
+              <a:t>4/9/2025</a:t>
             </a:fld>
             <a:endParaRPr lang="en-US"/>
           </a:p>
@@ -28108,7 +28108,7 @@
           <a:p>
             <a:fld id="{824D5D47-1752-4D84-8BFB-C2F71A34C932}" type="datetime1">
               <a:rPr lang="en-US" smtClean="0"/>
-              <a:t>3/27/2025</a:t>
+              <a:t>4/9/2025</a:t>
             </a:fld>
             <a:endParaRPr lang="en-US"/>
           </a:p>
@@ -28262,7 +28262,7 @@
           <a:p>
             <a:fld id="{824D5D47-1752-4D84-8BFB-C2F71A34C932}" type="datetime1">
               <a:rPr lang="en-US" smtClean="0"/>
-              <a:t>3/27/2025</a:t>
+              <a:t>4/9/2025</a:t>
             </a:fld>
             <a:endParaRPr lang="en-US"/>
           </a:p>
@@ -28693,7 +28693,7 @@
           <a:p>
             <a:fld id="{824D5D47-1752-4D84-8BFB-C2F71A34C932}" type="datetime1">
               <a:rPr lang="en-US" smtClean="0"/>
-              <a:t>3/27/2025</a:t>
+              <a:t>4/9/2025</a:t>
             </a:fld>
             <a:endParaRPr lang="en-US"/>
           </a:p>
@@ -28997,7 +28997,7 @@
           <a:p>
             <a:fld id="{824D5D47-1752-4D84-8BFB-C2F71A34C932}" type="datetime1">
               <a:rPr lang="en-US" smtClean="0"/>
-              <a:t>3/27/2025</a:t>
+              <a:t>4/9/2025</a:t>
             </a:fld>
             <a:endParaRPr lang="en-US"/>
           </a:p>
@@ -29358,7 +29358,7 @@
           <a:p>
             <a:fld id="{824D5D47-1752-4D84-8BFB-C2F71A34C932}" type="datetime1">
               <a:rPr lang="en-US" smtClean="0"/>
-              <a:t>3/27/2025</a:t>
+              <a:t>4/9/2025</a:t>
             </a:fld>
             <a:endParaRPr lang="en-US"/>
           </a:p>
@@ -29473,7 +29473,7 @@
           <a:lstStyle/>
           <a:p>
             <a:r>
-              <a:rPr lang="en-US"/>
+              <a:rPr lang="en-US" dirty="0"/>
               <a:t>Summary</a:t>
             </a:r>
           </a:p>
@@ -29574,7 +29574,7 @@
           <a:p>
             <a:fld id="{824D5D47-1752-4D84-8BFB-C2F71A34C932}" type="datetime1">
               <a:rPr lang="en-US" smtClean="0"/>
-              <a:t>3/27/2025</a:t>
+              <a:t>4/9/2025</a:t>
             </a:fld>
             <a:endParaRPr lang="en-US"/>
           </a:p>
@@ -29823,7 +29823,7 @@
           <a:p>
             <a:fld id="{9A198C9B-0587-4A1E-9E03-E4C9FE222F08}" type="datetime1">
               <a:rPr lang="en-US" smtClean="0"/>
-              <a:t>3/27/2025</a:t>
+              <a:t>4/9/2025</a:t>
             </a:fld>
             <a:endParaRPr lang="en-US"/>
           </a:p>
@@ -29943,7 +29943,7 @@
           <a:lstStyle/>
           <a:p>
             <a:r>
-              <a:rPr lang="en-US"/>
+              <a:rPr lang="en-US" dirty="0"/>
               <a:t>Questions</a:t>
             </a:r>
           </a:p>
@@ -29972,7 +29972,7 @@
           <a:p>
             <a:fld id="{824D5D47-1752-4D84-8BFB-C2F71A34C932}" type="datetime1">
               <a:rPr lang="en-US" smtClean="0"/>
-              <a:t>3/27/2025</a:t>
+              <a:t>4/9/2025</a:t>
             </a:fld>
             <a:endParaRPr lang="en-US"/>
           </a:p>
@@ -30081,7 +30081,7 @@
           <a:lstStyle/>
           <a:p>
             <a:r>
-              <a:rPr lang="en-US"/>
+              <a:rPr lang="en-US" dirty="0"/>
               <a:t>Thank You!</a:t>
             </a:r>
           </a:p>
@@ -30155,6 +30155,39 @@
       </p:grpSpPr>
       <p:sp>
         <p:nvSpPr>
+          <p:cNvPr id="2" name="Title 1">
+            <a:extLst>
+              <a:ext uri="{FF2B5EF4-FFF2-40B4-BE49-F238E27FC236}">
+                <a16:creationId xmlns:a16="http://schemas.microsoft.com/office/drawing/2014/main" id="{BD83D313-CA8A-903F-0420-F42685C3BA89}"/>
+              </a:ext>
+            </a:extLst>
+          </p:cNvPr>
+          <p:cNvSpPr>
+            <a:spLocks noGrp="1"/>
+          </p:cNvSpPr>
+          <p:nvPr>
+            <p:ph type="title"/>
+          </p:nvPr>
+        </p:nvSpPr>
+        <p:spPr>
+          <a:xfrm>
+            <a:off x="838200" y="-1"/>
+            <a:ext cx="10515600" cy="1216025"/>
+          </a:xfrm>
+        </p:spPr>
+        <p:txBody>
+          <a:bodyPr/>
+          <a:lstStyle/>
+          <a:p>
+            <a:r>
+              <a:rPr lang="en-US" dirty="0"/>
+              <a:t>Shiny Demonstrations</a:t>
+            </a:r>
+          </a:p>
+        </p:txBody>
+      </p:sp>
+      <p:sp>
+        <p:nvSpPr>
           <p:cNvPr id="11" name="Content Placeholder 10">
             <a:extLst>
               <a:ext uri="{FF2B5EF4-FFF2-40B4-BE49-F238E27FC236}">
@@ -30176,12 +30209,10 @@
           </a:bodyPr>
           <a:lstStyle/>
           <a:p>
-            <a:pPr algn="ctr"/>
-            <a:endParaRPr lang="en-US" b="1"/>
-          </a:p>
-          <a:p>
-            <a:pPr algn="ctr"/>
-            <a:endParaRPr lang="en-US" b="1">
+            <a:pPr marL="0" indent="0" algn="ctr">
+              <a:buNone/>
+            </a:pPr>
+            <a:endParaRPr lang="en-US" sz="4000" b="1" dirty="0">
               <a:ea typeface="Calibri"/>
               <a:cs typeface="Calibri"/>
             </a:endParaRPr>
@@ -30190,11 +30221,7 @@
             <a:pPr marL="0" indent="0" algn="ctr">
               <a:buNone/>
             </a:pPr>
-            <a:r>
-              <a:rPr lang="en-US" sz="4000" b="1"/>
-              <a:t>Shiny Demonstrations</a:t>
-            </a:r>
-            <a:endParaRPr lang="en-US" sz="4000" b="1">
+            <a:endParaRPr lang="en-US" sz="4000" b="1" dirty="0">
               <a:ea typeface="Calibri"/>
               <a:cs typeface="Calibri"/>
             </a:endParaRPr>
@@ -30203,40 +30230,22 @@
             <a:pPr marL="0" indent="0" algn="ctr">
               <a:buNone/>
             </a:pPr>
-            <a:endParaRPr lang="en-US" sz="4000" b="1">
-              <a:ea typeface="Calibri"/>
-              <a:cs typeface="Calibri"/>
-            </a:endParaRPr>
-          </a:p>
-          <a:p>
-            <a:pPr marL="0" indent="0" algn="ctr">
-              <a:buNone/>
-            </a:pPr>
-            <a:endParaRPr lang="en-US" sz="4000" b="1">
-              <a:ea typeface="Calibri"/>
-              <a:cs typeface="Calibri"/>
-            </a:endParaRPr>
-          </a:p>
-          <a:p>
-            <a:pPr marL="0" indent="0" algn="ctr">
-              <a:buNone/>
-            </a:pPr>
-            <a:r>
-              <a:rPr lang="en-US" sz="2800">
+            <a:r>
+              <a:rPr lang="en-US" sz="2800" dirty="0">
                 <a:ea typeface="Calibri"/>
                 <a:cs typeface="Calibri"/>
               </a:rPr>
               <a:t>Online: </a:t>
             </a:r>
             <a:r>
-              <a:rPr lang="en-US" sz="2800">
+              <a:rPr lang="en-US" sz="2800" dirty="0">
                 <a:ea typeface="+mn-lt"/>
                 <a:cs typeface="+mn-lt"/>
                 <a:hlinkClick r:id="rId3"/>
               </a:rPr>
               <a:t>https://github.com/tidy-MN/shiny-a11y-apps</a:t>
             </a:r>
-            <a:endParaRPr lang="en-US" sz="2800">
+            <a:endParaRPr lang="en-US" sz="2800" dirty="0">
               <a:ea typeface="Calibri"/>
               <a:cs typeface="Calibri"/>
             </a:endParaRPr>
@@ -30266,7 +30275,7 @@
           <a:p>
             <a:fld id="{7C198DD1-C477-482D-A126-3FBDD1778E48}" type="datetime1">
               <a:rPr lang="en-US" smtClean="0"/>
-              <a:t>3/27/2025</a:t>
+              <a:t>4/9/2025</a:t>
             </a:fld>
             <a:endParaRPr lang="en-US"/>
           </a:p>
@@ -30486,7 +30495,7 @@
           <a:p>
             <a:fld id="{7C198DD1-C477-482D-A126-3FBDD1778E48}" type="datetime1">
               <a:rPr lang="en-US" smtClean="0"/>
-              <a:t>3/27/2025</a:t>
+              <a:t>4/9/2025</a:t>
             </a:fld>
             <a:endParaRPr lang="en-US"/>
           </a:p>
@@ -30727,7 +30736,7 @@
           <a:p>
             <a:fld id="{7C198DD1-C477-482D-A126-3FBDD1778E48}" type="datetime1">
               <a:rPr lang="en-US" smtClean="0"/>
-              <a:t>3/27/2025</a:t>
+              <a:t>4/9/2025</a:t>
             </a:fld>
             <a:endParaRPr lang="en-US"/>
           </a:p>
@@ -31004,7 +31013,7 @@
           <a:p>
             <a:fld id="{824D5D47-1752-4D84-8BFB-C2F71A34C932}" type="datetime1">
               <a:rPr lang="en-US" smtClean="0"/>
-              <a:t>3/27/2025</a:t>
+              <a:t>4/9/2025</a:t>
             </a:fld>
             <a:endParaRPr lang="en-US"/>
           </a:p>
@@ -31269,7 +31278,7 @@
           <a:p>
             <a:fld id="{824D5D47-1752-4D84-8BFB-C2F71A34C932}" type="datetime1">
               <a:rPr lang="en-US" smtClean="0"/>
-              <a:t>3/27/2025</a:t>
+              <a:t>4/9/2025</a:t>
             </a:fld>
             <a:endParaRPr lang="en-US"/>
           </a:p>
@@ -31614,7 +31623,7 @@
           <a:p>
             <a:fld id="{824D5D47-1752-4D84-8BFB-C2F71A34C932}" type="datetime1">
               <a:rPr lang="en-US" smtClean="0"/>
-              <a:t>3/27/2025</a:t>
+              <a:t>4/9/2025</a:t>
             </a:fld>
             <a:endParaRPr lang="en-US"/>
           </a:p>
@@ -32341,7 +32350,7 @@
           <a:p>
             <a:fld id="{824D5D47-1752-4D84-8BFB-C2F71A34C932}" type="datetime1">
               <a:rPr lang="en-US" smtClean="0"/>
-              <a:t>3/27/2025</a:t>
+              <a:t>4/9/2025</a:t>
             </a:fld>
             <a:endParaRPr lang="en-US"/>
           </a:p>
@@ -32991,7 +33000,7 @@
           <a:p>
             <a:fld id="{824D5D47-1752-4D84-8BFB-C2F71A34C932}" type="datetime1">
               <a:rPr lang="en-US" smtClean="0"/>
-              <a:t>3/27/2025</a:t>
+              <a:t>4/9/2025</a:t>
             </a:fld>
             <a:endParaRPr lang="en-US"/>
           </a:p>
@@ -33810,12 +33819,20 @@
 </file>
 
 <file path=customXml/item2.xml><?xml version="1.0" encoding="utf-8"?>
-<?mso-contentType ?>
-<FormTemplates xmlns="http://schemas.microsoft.com/sharepoint/v3/contenttype/forms">
-  <Display>DocumentLibraryForm</Display>
-  <Edit>DocumentLibraryForm</Edit>
-  <New>DocumentLibraryForm</New>
-</FormTemplates>
+<p:properties xmlns:p="http://schemas.microsoft.com/office/2006/metadata/properties" xmlns:xsi="http://www.w3.org/2001/XMLSchema-instance" xmlns:pc="http://schemas.microsoft.com/office/infopath/2007/PartnerControls">
+  <documentManagement>
+    <_dlc_DocId xmlns="98f01fe9-c3f2-4582-9148-d87bd0c242e7">PP6VNZTUNPYT-222210944-159</_dlc_DocId>
+    <_dlc_DocIdUrl xmlns="98f01fe9-c3f2-4582-9148-d87bd0c242e7">
+      <Url>https://mn365.sharepoint.com/teams/MDH/permanent/comm_proj/_layouts/15/DocIdRedir.aspx?ID=PP6VNZTUNPYT-222210944-159</Url>
+      <Description>PP6VNZTUNPYT-222210944-159</Description>
+    </_dlc_DocIdUrl>
+    <Date_x0020_Last_x0020_Reviewed xmlns="98f01fe9-c3f2-4582-9148-d87bd0c242e7" xsi:nil="true"/>
+    <lcf76f155ced4ddcb4097134ff3c332f xmlns="8837c207-459e-4c9e-ae67-73e2034e87a2">
+      <Terms xmlns="http://schemas.microsoft.com/office/infopath/2007/PartnerControls"/>
+    </lcf76f155ced4ddcb4097134ff3c332f>
+    <TaxCatchAll xmlns="98f01fe9-c3f2-4582-9148-d87bd0c242e7" xsi:nil="true"/>
+  </documentManagement>
+</p:properties>
 </file>
 
 <file path=customXml/item3.xml><?xml version="1.0" encoding="utf-8"?>
@@ -34078,20 +34095,12 @@
 </file>
 
 <file path=customXml/item4.xml><?xml version="1.0" encoding="utf-8"?>
-<p:properties xmlns:p="http://schemas.microsoft.com/office/2006/metadata/properties" xmlns:xsi="http://www.w3.org/2001/XMLSchema-instance" xmlns:pc="http://schemas.microsoft.com/office/infopath/2007/PartnerControls">
-  <documentManagement>
-    <_dlc_DocId xmlns="98f01fe9-c3f2-4582-9148-d87bd0c242e7">PP6VNZTUNPYT-222210944-159</_dlc_DocId>
-    <_dlc_DocIdUrl xmlns="98f01fe9-c3f2-4582-9148-d87bd0c242e7">
-      <Url>https://mn365.sharepoint.com/teams/MDH/permanent/comm_proj/_layouts/15/DocIdRedir.aspx?ID=PP6VNZTUNPYT-222210944-159</Url>
-      <Description>PP6VNZTUNPYT-222210944-159</Description>
-    </_dlc_DocIdUrl>
-    <Date_x0020_Last_x0020_Reviewed xmlns="98f01fe9-c3f2-4582-9148-d87bd0c242e7" xsi:nil="true"/>
-    <lcf76f155ced4ddcb4097134ff3c332f xmlns="8837c207-459e-4c9e-ae67-73e2034e87a2">
-      <Terms xmlns="http://schemas.microsoft.com/office/infopath/2007/PartnerControls"/>
-    </lcf76f155ced4ddcb4097134ff3c332f>
-    <TaxCatchAll xmlns="98f01fe9-c3f2-4582-9148-d87bd0c242e7" xsi:nil="true"/>
-  </documentManagement>
-</p:properties>
+<?mso-contentType ?>
+<FormTemplates xmlns="http://schemas.microsoft.com/sharepoint/v3/contenttype/forms">
+  <Display>DocumentLibraryForm</Display>
+  <Edit>DocumentLibraryForm</Edit>
+  <New>DocumentLibraryForm</New>
+</FormTemplates>
 </file>
 
 <file path=customXml/itemProps1.xml><?xml version="1.0" encoding="utf-8"?>
@@ -34104,9 +34113,19 @@
 </file>
 
 <file path=customXml/itemProps2.xml><?xml version="1.0" encoding="utf-8"?>
-<ds:datastoreItem xmlns:ds="http://schemas.openxmlformats.org/officeDocument/2006/customXml" ds:itemID="{67F4349A-22F7-4A2D-8CA5-43DDCD679590}">
+<ds:datastoreItem xmlns:ds="http://schemas.openxmlformats.org/officeDocument/2006/customXml" ds:itemID="{9678B604-9059-4F1C-B8E2-C96A71A964D2}">
   <ds:schemaRefs>
-    <ds:schemaRef ds:uri="http://schemas.microsoft.com/sharepoint/v3/contenttype/forms"/>
+    <ds:schemaRef ds:uri="8837c207-459e-4c9e-ae67-73e2034e87a2"/>
+    <ds:schemaRef ds:uri="http://schemas.openxmlformats.org/package/2006/metadata/core-properties"/>
+    <ds:schemaRef ds:uri="http://purl.org/dc/elements/1.1/"/>
+    <ds:schemaRef ds:uri="fc253db8-c1a2-4032-adc2-d3fbd160fc76"/>
+    <ds:schemaRef ds:uri="98f01fe9-c3f2-4582-9148-d87bd0c242e7"/>
+    <ds:schemaRef ds:uri="http://schemas.microsoft.com/office/2006/metadata/properties"/>
+    <ds:schemaRef ds:uri="http://purl.org/dc/terms/"/>
+    <ds:schemaRef ds:uri="http://schemas.microsoft.com/office/2006/documentManagement/types"/>
+    <ds:schemaRef ds:uri="http://schemas.microsoft.com/office/infopath/2007/PartnerControls"/>
+    <ds:schemaRef ds:uri="http://www.w3.org/XML/1998/namespace"/>
+    <ds:schemaRef ds:uri="http://purl.org/dc/dcmitype/"/>
   </ds:schemaRefs>
 </ds:datastoreItem>
 </file>
@@ -34132,19 +34151,9 @@
 </file>
 
 <file path=customXml/itemProps4.xml><?xml version="1.0" encoding="utf-8"?>
-<ds:datastoreItem xmlns:ds="http://schemas.openxmlformats.org/officeDocument/2006/customXml" ds:itemID="{9678B604-9059-4F1C-B8E2-C96A71A964D2}">
+<ds:datastoreItem xmlns:ds="http://schemas.openxmlformats.org/officeDocument/2006/customXml" ds:itemID="{67F4349A-22F7-4A2D-8CA5-43DDCD679590}">
   <ds:schemaRefs>
-    <ds:schemaRef ds:uri="8837c207-459e-4c9e-ae67-73e2034e87a2"/>
-    <ds:schemaRef ds:uri="98f01fe9-c3f2-4582-9148-d87bd0c242e7"/>
-    <ds:schemaRef ds:uri="fc253db8-c1a2-4032-adc2-d3fbd160fc76"/>
-    <ds:schemaRef ds:uri="http://purl.org/dc/dcmitype/"/>
-    <ds:schemaRef ds:uri="http://purl.org/dc/elements/1.1/"/>
-    <ds:schemaRef ds:uri="http://purl.org/dc/terms/"/>
-    <ds:schemaRef ds:uri="http://schemas.microsoft.com/office/2006/documentManagement/types"/>
-    <ds:schemaRef ds:uri="http://schemas.microsoft.com/office/2006/metadata/properties"/>
-    <ds:schemaRef ds:uri="http://schemas.microsoft.com/office/infopath/2007/PartnerControls"/>
-    <ds:schemaRef ds:uri="http://schemas.openxmlformats.org/package/2006/metadata/core-properties"/>
-    <ds:schemaRef ds:uri="http://www.w3.org/XML/1998/namespace"/>
+    <ds:schemaRef ds:uri="http://schemas.microsoft.com/sharepoint/v3/contenttype/forms"/>
   </ds:schemaRefs>
 </ds:datastoreItem>
 </file>
</xml_diff>